<commit_message>
added a challenge to the presentation
</commit_message>
<xml_diff>
--- a/Kickoff Presentation.pptx
+++ b/Kickoff Presentation.pptx
@@ -108,6 +108,11 @@
       </a:defRPr>
     </a:lvl9pPr>
   </p:defaultTextStyle>
+  <p:extLst>
+    <p:ext uri="{EFAFB233-063F-42B5-8137-9DF3F51BA10A}">
+      <p15:sldGuideLst xmlns:p15="http://schemas.microsoft.com/office/powerpoint/2012/main"/>
+    </p:ext>
+  </p:extLst>
 </p:presentation>
 </file>
 
@@ -156,7 +161,6 @@
               <a:rPr lang="de-DE"/>
               <a:t>Titelmasterformat durch Klicken bearbeiten</a:t>
             </a:r>
-            <a:endParaRPr lang="de-DE"/>
           </a:p>
         </p:txBody>
       </p:sp>
@@ -221,7 +225,6 @@
               <a:rPr lang="de-DE"/>
               <a:t>Formatvorlage des Untertitelmasters durch Klicken bearbeiten</a:t>
             </a:r>
-            <a:endParaRPr lang="de-DE"/>
           </a:p>
         </p:txBody>
       </p:sp>
@@ -242,7 +245,7 @@
           <a:p>
             <a:fld id="{31F1AE49-BA11-44D5-9279-0578C0CE861F}" type="datetimeFigureOut">
               <a:rPr lang="de-DE" smtClean="0"/>
-              <a:t>03.04.2017</a:t>
+              <a:t>04.04.2017</a:t>
             </a:fld>
             <a:endParaRPr lang="de-DE"/>
           </a:p>
@@ -339,7 +342,6 @@
               <a:rPr lang="de-DE"/>
               <a:t>Titelmasterformat durch Klicken bearbeiten</a:t>
             </a:r>
-            <a:endParaRPr lang="de-DE"/>
           </a:p>
         </p:txBody>
       </p:sp>
@@ -391,7 +393,6 @@
               <a:rPr lang="de-DE"/>
               <a:t>Fünfte Ebene</a:t>
             </a:r>
-            <a:endParaRPr lang="de-DE"/>
           </a:p>
         </p:txBody>
       </p:sp>
@@ -412,7 +413,7 @@
           <a:p>
             <a:fld id="{31F1AE49-BA11-44D5-9279-0578C0CE861F}" type="datetimeFigureOut">
               <a:rPr lang="de-DE" smtClean="0"/>
-              <a:t>03.04.2017</a:t>
+              <a:t>04.04.2017</a:t>
             </a:fld>
             <a:endParaRPr lang="de-DE"/>
           </a:p>
@@ -514,7 +515,6 @@
               <a:rPr lang="de-DE"/>
               <a:t>Titelmasterformat durch Klicken bearbeiten</a:t>
             </a:r>
-            <a:endParaRPr lang="de-DE"/>
           </a:p>
         </p:txBody>
       </p:sp>
@@ -571,7 +571,6 @@
               <a:rPr lang="de-DE"/>
               <a:t>Fünfte Ebene</a:t>
             </a:r>
-            <a:endParaRPr lang="de-DE"/>
           </a:p>
         </p:txBody>
       </p:sp>
@@ -592,7 +591,7 @@
           <a:p>
             <a:fld id="{31F1AE49-BA11-44D5-9279-0578C0CE861F}" type="datetimeFigureOut">
               <a:rPr lang="de-DE" smtClean="0"/>
-              <a:t>03.04.2017</a:t>
+              <a:t>04.04.2017</a:t>
             </a:fld>
             <a:endParaRPr lang="de-DE"/>
           </a:p>
@@ -689,7 +688,6 @@
               <a:rPr lang="de-DE"/>
               <a:t>Titelmasterformat durch Klicken bearbeiten</a:t>
             </a:r>
-            <a:endParaRPr lang="de-DE"/>
           </a:p>
         </p:txBody>
       </p:sp>
@@ -741,7 +739,6 @@
               <a:rPr lang="de-DE"/>
               <a:t>Fünfte Ebene</a:t>
             </a:r>
-            <a:endParaRPr lang="de-DE"/>
           </a:p>
         </p:txBody>
       </p:sp>
@@ -762,7 +759,7 @@
           <a:p>
             <a:fld id="{31F1AE49-BA11-44D5-9279-0578C0CE861F}" type="datetimeFigureOut">
               <a:rPr lang="de-DE" smtClean="0"/>
-              <a:t>03.04.2017</a:t>
+              <a:t>04.04.2017</a:t>
             </a:fld>
             <a:endParaRPr lang="de-DE"/>
           </a:p>
@@ -868,7 +865,6 @@
               <a:rPr lang="de-DE"/>
               <a:t>Titelmasterformat durch Klicken bearbeiten</a:t>
             </a:r>
-            <a:endParaRPr lang="de-DE"/>
           </a:p>
         </p:txBody>
       </p:sp>
@@ -1008,7 +1004,7 @@
           <a:p>
             <a:fld id="{31F1AE49-BA11-44D5-9279-0578C0CE861F}" type="datetimeFigureOut">
               <a:rPr lang="de-DE" smtClean="0"/>
-              <a:t>03.04.2017</a:t>
+              <a:t>04.04.2017</a:t>
             </a:fld>
             <a:endParaRPr lang="de-DE"/>
           </a:p>
@@ -1105,7 +1101,6 @@
               <a:rPr lang="de-DE"/>
               <a:t>Titelmasterformat durch Klicken bearbeiten</a:t>
             </a:r>
-            <a:endParaRPr lang="de-DE"/>
           </a:p>
         </p:txBody>
       </p:sp>
@@ -1162,7 +1157,6 @@
               <a:rPr lang="de-DE"/>
               <a:t>Fünfte Ebene</a:t>
             </a:r>
-            <a:endParaRPr lang="de-DE"/>
           </a:p>
         </p:txBody>
       </p:sp>
@@ -1219,7 +1213,6 @@
               <a:rPr lang="de-DE"/>
               <a:t>Fünfte Ebene</a:t>
             </a:r>
-            <a:endParaRPr lang="de-DE"/>
           </a:p>
         </p:txBody>
       </p:sp>
@@ -1240,7 +1233,7 @@
           <a:p>
             <a:fld id="{31F1AE49-BA11-44D5-9279-0578C0CE861F}" type="datetimeFigureOut">
               <a:rPr lang="de-DE" smtClean="0"/>
-              <a:t>03.04.2017</a:t>
+              <a:t>04.04.2017</a:t>
             </a:fld>
             <a:endParaRPr lang="de-DE"/>
           </a:p>
@@ -1342,7 +1335,6 @@
               <a:rPr lang="de-DE"/>
               <a:t>Titelmasterformat durch Klicken bearbeiten</a:t>
             </a:r>
-            <a:endParaRPr lang="de-DE"/>
           </a:p>
         </p:txBody>
       </p:sp>
@@ -1464,7 +1456,6 @@
               <a:rPr lang="de-DE"/>
               <a:t>Fünfte Ebene</a:t>
             </a:r>
-            <a:endParaRPr lang="de-DE"/>
           </a:p>
         </p:txBody>
       </p:sp>
@@ -1586,7 +1577,6 @@
               <a:rPr lang="de-DE"/>
               <a:t>Fünfte Ebene</a:t>
             </a:r>
-            <a:endParaRPr lang="de-DE"/>
           </a:p>
         </p:txBody>
       </p:sp>
@@ -1607,7 +1597,7 @@
           <a:p>
             <a:fld id="{31F1AE49-BA11-44D5-9279-0578C0CE861F}" type="datetimeFigureOut">
               <a:rPr lang="de-DE" smtClean="0"/>
-              <a:t>03.04.2017</a:t>
+              <a:t>04.04.2017</a:t>
             </a:fld>
             <a:endParaRPr lang="de-DE"/>
           </a:p>
@@ -1704,7 +1694,6 @@
               <a:rPr lang="de-DE"/>
               <a:t>Titelmasterformat durch Klicken bearbeiten</a:t>
             </a:r>
-            <a:endParaRPr lang="de-DE"/>
           </a:p>
         </p:txBody>
       </p:sp>
@@ -1725,7 +1714,7 @@
           <a:p>
             <a:fld id="{31F1AE49-BA11-44D5-9279-0578C0CE861F}" type="datetimeFigureOut">
               <a:rPr lang="de-DE" smtClean="0"/>
-              <a:t>03.04.2017</a:t>
+              <a:t>04.04.2017</a:t>
             </a:fld>
             <a:endParaRPr lang="de-DE"/>
           </a:p>
@@ -1820,7 +1809,7 @@
           <a:p>
             <a:fld id="{31F1AE49-BA11-44D5-9279-0578C0CE861F}" type="datetimeFigureOut">
               <a:rPr lang="de-DE" smtClean="0"/>
-              <a:t>03.04.2017</a:t>
+              <a:t>04.04.2017</a:t>
             </a:fld>
             <a:endParaRPr lang="de-DE"/>
           </a:p>
@@ -1926,7 +1915,6 @@
               <a:rPr lang="de-DE"/>
               <a:t>Titelmasterformat durch Klicken bearbeiten</a:t>
             </a:r>
-            <a:endParaRPr lang="de-DE"/>
           </a:p>
         </p:txBody>
       </p:sp>
@@ -2011,7 +1999,6 @@
               <a:rPr lang="de-DE"/>
               <a:t>Fünfte Ebene</a:t>
             </a:r>
-            <a:endParaRPr lang="de-DE"/>
           </a:p>
         </p:txBody>
       </p:sp>
@@ -2097,7 +2084,7 @@
           <a:p>
             <a:fld id="{31F1AE49-BA11-44D5-9279-0578C0CE861F}" type="datetimeFigureOut">
               <a:rPr lang="de-DE" smtClean="0"/>
-              <a:t>03.04.2017</a:t>
+              <a:t>04.04.2017</a:t>
             </a:fld>
             <a:endParaRPr lang="de-DE"/>
           </a:p>
@@ -2203,7 +2190,6 @@
               <a:rPr lang="de-DE"/>
               <a:t>Titelmasterformat durch Klicken bearbeiten</a:t>
             </a:r>
-            <a:endParaRPr lang="de-DE"/>
           </a:p>
         </p:txBody>
       </p:sp>
@@ -2350,7 +2336,7 @@
           <a:p>
             <a:fld id="{31F1AE49-BA11-44D5-9279-0578C0CE861F}" type="datetimeFigureOut">
               <a:rPr lang="de-DE" smtClean="0"/>
-              <a:t>03.04.2017</a:t>
+              <a:t>04.04.2017</a:t>
             </a:fld>
             <a:endParaRPr lang="de-DE"/>
           </a:p>
@@ -2462,7 +2448,6 @@
               <a:rPr lang="de-DE"/>
               <a:t>Titelmasterformat durch Klicken bearbeiten</a:t>
             </a:r>
-            <a:endParaRPr lang="de-DE"/>
           </a:p>
         </p:txBody>
       </p:sp>
@@ -2524,7 +2509,6 @@
               <a:rPr lang="de-DE"/>
               <a:t>Fünfte Ebene</a:t>
             </a:r>
-            <a:endParaRPr lang="de-DE"/>
           </a:p>
         </p:txBody>
       </p:sp>
@@ -2563,7 +2547,7 @@
           <a:p>
             <a:fld id="{31F1AE49-BA11-44D5-9279-0578C0CE861F}" type="datetimeFigureOut">
               <a:rPr lang="de-DE" smtClean="0"/>
-              <a:t>03.04.2017</a:t>
+              <a:t>04.04.2017</a:t>
             </a:fld>
             <a:endParaRPr lang="de-DE"/>
           </a:p>
@@ -3008,11 +2992,7 @@
           <a:p>
             <a:r>
               <a:rPr lang="en-GB" dirty="0"/>
-              <a:t>Dario Cantore, Calvin Chi, Josiah Davis, </a:t>
-            </a:r>
-            <a:r>
-              <a:rPr lang="en-GB" dirty="0"/>
-              <a:t>Daniel Lee</a:t>
+              <a:t>Dario Cantore, Calvin Chi, Josiah Davis, Daniel Lee</a:t>
             </a:r>
             <a:endParaRPr lang="de-DE" dirty="0"/>
           </a:p>
@@ -3434,6 +3414,16 @@
             <a:r>
               <a:rPr lang="en-GB" dirty="0"/>
               <a:t>Which independence assumptions / exclusion restrictions should we make? </a:t>
+            </a:r>
+          </a:p>
+          <a:p>
+            <a:r>
+              <a:rPr lang="en-GB" dirty="0"/>
+              <a:t>How to address multi-level intervention </a:t>
+            </a:r>
+            <a:r>
+              <a:rPr lang="en-GB"/>
+              <a:t>/ features?</a:t>
             </a:r>
           </a:p>
           <a:p>

</xml_diff>